<commit_message>
Updated Slides in Folder
</commit_message>
<xml_diff>
--- a/CE599_JB_Project/A Comparative Study of GPS and Bluetooth Speed Data ALong Man O War Boulevard.pptx
+++ b/CE599_JB_Project/A Comparative Study of GPS and Bluetooth Speed Data ALong Man O War Boulevard.pptx
@@ -6,19 +6,20 @@
   </p:sldMasterIdLst>
   <p:sldIdLst>
     <p:sldId id="256" r:id="rId2"/>
-    <p:sldId id="263" r:id="rId3"/>
-    <p:sldId id="257" r:id="rId4"/>
-    <p:sldId id="258" r:id="rId5"/>
-    <p:sldId id="259" r:id="rId6"/>
-    <p:sldId id="261" r:id="rId7"/>
+    <p:sldId id="261" r:id="rId3"/>
+    <p:sldId id="263" r:id="rId4"/>
+    <p:sldId id="259" r:id="rId5"/>
+    <p:sldId id="258" r:id="rId6"/>
+    <p:sldId id="257" r:id="rId7"/>
     <p:sldId id="264" r:id="rId8"/>
-    <p:sldId id="267" r:id="rId9"/>
-    <p:sldId id="269" r:id="rId10"/>
-    <p:sldId id="260" r:id="rId11"/>
-    <p:sldId id="265" r:id="rId12"/>
-    <p:sldId id="266" r:id="rId13"/>
+    <p:sldId id="260" r:id="rId9"/>
+    <p:sldId id="265" r:id="rId10"/>
+    <p:sldId id="266" r:id="rId11"/>
+    <p:sldId id="267" r:id="rId12"/>
+    <p:sldId id="269" r:id="rId13"/>
     <p:sldId id="270" r:id="rId14"/>
-    <p:sldId id="262" r:id="rId15"/>
+    <p:sldId id="271" r:id="rId15"/>
+    <p:sldId id="262" r:id="rId16"/>
   </p:sldIdLst>
   <p:sldSz cx="12192000" cy="6858000"/>
   <p:notesSz cx="6858000" cy="9144000"/>
@@ -321,7 +322,7 @@
           <a:p>
             <a:fld id="{2A7A4449-FC70-4CD6-98EE-8B4FB5AE25CF}" type="datetimeFigureOut">
               <a:rPr lang="en-US" smtClean="0"/>
-              <a:t>4/23/2017</a:t>
+              <a:t>4/26/2017</a:t>
             </a:fld>
             <a:endParaRPr lang="en-US"/>
           </a:p>
@@ -542,7 +543,7 @@
           <a:p>
             <a:fld id="{2A7A4449-FC70-4CD6-98EE-8B4FB5AE25CF}" type="datetimeFigureOut">
               <a:rPr lang="en-US" smtClean="0"/>
-              <a:t>4/23/2017</a:t>
+              <a:t>4/26/2017</a:t>
             </a:fld>
             <a:endParaRPr lang="en-US"/>
           </a:p>
@@ -722,7 +723,7 @@
           <a:p>
             <a:fld id="{2A7A4449-FC70-4CD6-98EE-8B4FB5AE25CF}" type="datetimeFigureOut">
               <a:rPr lang="en-US" smtClean="0"/>
-              <a:t>4/23/2017</a:t>
+              <a:t>4/26/2017</a:t>
             </a:fld>
             <a:endParaRPr lang="en-US"/>
           </a:p>
@@ -892,7 +893,7 @@
           <a:p>
             <a:fld id="{2A7A4449-FC70-4CD6-98EE-8B4FB5AE25CF}" type="datetimeFigureOut">
               <a:rPr lang="en-US" smtClean="0"/>
-              <a:t>4/23/2017</a:t>
+              <a:t>4/26/2017</a:t>
             </a:fld>
             <a:endParaRPr lang="en-US"/>
           </a:p>
@@ -1143,7 +1144,7 @@
           <a:p>
             <a:fld id="{2A7A4449-FC70-4CD6-98EE-8B4FB5AE25CF}" type="datetimeFigureOut">
               <a:rPr lang="en-US" smtClean="0"/>
-              <a:t>4/23/2017</a:t>
+              <a:t>4/26/2017</a:t>
             </a:fld>
             <a:endParaRPr lang="en-US"/>
           </a:p>
@@ -1466,7 +1467,7 @@
           <a:p>
             <a:fld id="{2A7A4449-FC70-4CD6-98EE-8B4FB5AE25CF}" type="datetimeFigureOut">
               <a:rPr lang="en-US" smtClean="0"/>
-              <a:t>4/23/2017</a:t>
+              <a:t>4/26/2017</a:t>
             </a:fld>
             <a:endParaRPr lang="en-US"/>
           </a:p>
@@ -1890,7 +1891,7 @@
           <a:p>
             <a:fld id="{2A7A4449-FC70-4CD6-98EE-8B4FB5AE25CF}" type="datetimeFigureOut">
               <a:rPr lang="en-US" smtClean="0"/>
-              <a:t>4/23/2017</a:t>
+              <a:t>4/26/2017</a:t>
             </a:fld>
             <a:endParaRPr lang="en-US"/>
           </a:p>
@@ -2008,7 +2009,7 @@
           <a:p>
             <a:fld id="{2A7A4449-FC70-4CD6-98EE-8B4FB5AE25CF}" type="datetimeFigureOut">
               <a:rPr lang="en-US" smtClean="0"/>
-              <a:t>4/23/2017</a:t>
+              <a:t>4/26/2017</a:t>
             </a:fld>
             <a:endParaRPr lang="en-US"/>
           </a:p>
@@ -2103,7 +2104,7 @@
           <a:p>
             <a:fld id="{2A7A4449-FC70-4CD6-98EE-8B4FB5AE25CF}" type="datetimeFigureOut">
               <a:rPr lang="en-US" smtClean="0"/>
-              <a:t>4/23/2017</a:t>
+              <a:t>4/26/2017</a:t>
             </a:fld>
             <a:endParaRPr lang="en-US"/>
           </a:p>
@@ -2393,7 +2394,7 @@
           <a:p>
             <a:fld id="{2A7A4449-FC70-4CD6-98EE-8B4FB5AE25CF}" type="datetimeFigureOut">
               <a:rPr lang="en-US" smtClean="0"/>
-              <a:t>4/23/2017</a:t>
+              <a:t>4/26/2017</a:t>
             </a:fld>
             <a:endParaRPr lang="en-US"/>
           </a:p>
@@ -2665,7 +2666,7 @@
           <a:p>
             <a:fld id="{2A7A4449-FC70-4CD6-98EE-8B4FB5AE25CF}" type="datetimeFigureOut">
               <a:rPr lang="en-US" smtClean="0"/>
-              <a:t>4/23/2017</a:t>
+              <a:t>4/26/2017</a:t>
             </a:fld>
             <a:endParaRPr lang="en-US"/>
           </a:p>
@@ -2919,7 +2920,7 @@
           <a:p>
             <a:fld id="{2A7A4449-FC70-4CD6-98EE-8B4FB5AE25CF}" type="datetimeFigureOut">
               <a:rPr lang="en-US" smtClean="0"/>
-              <a:t>4/23/2017</a:t>
+              <a:t>4/26/2017</a:t>
             </a:fld>
             <a:endParaRPr lang="en-US"/>
           </a:p>
@@ -3480,131 +3481,83 @@
           <a:p>
             <a:r>
               <a:rPr lang="en-US" dirty="0"/>
-              <a:t>Comparisons</a:t>
-            </a:r>
-          </a:p>
-        </p:txBody>
-      </p:sp>
-      <p:sp>
-        <p:nvSpPr>
-          <p:cNvPr id="3" name="Content Placeholder 2"/>
-          <p:cNvSpPr>
-            <a:spLocks noGrp="1"/>
-          </p:cNvSpPr>
+              <a:t>Richmond Road to Alumni</a:t>
+            </a:r>
+          </a:p>
+        </p:txBody>
+      </p:sp>
+      <p:sp>
+        <p:nvSpPr>
+          <p:cNvPr id="5" name="TextBox 4"/>
+          <p:cNvSpPr txBox="1"/>
+          <p:nvPr/>
+        </p:nvSpPr>
+        <p:spPr>
+          <a:xfrm>
+            <a:off x="1143000" y="2251710"/>
+            <a:ext cx="2114550" cy="2031325"/>
+          </a:xfrm>
+          <a:prstGeom prst="rect">
+            <a:avLst/>
+          </a:prstGeom>
+          <a:noFill/>
+        </p:spPr>
+        <p:txBody>
+          <a:bodyPr wrap="square" rtlCol="0">
+            <a:spAutoFit/>
+          </a:bodyPr>
+          <a:lstStyle/>
+          <a:p>
+            <a:r>
+              <a:rPr lang="en-US" dirty="0"/>
+              <a:t>Notes:</a:t>
+            </a:r>
+          </a:p>
+          <a:p>
+            <a:endParaRPr lang="en-US" dirty="0"/>
+          </a:p>
+          <a:p>
+            <a:pPr marL="285750" indent="-285750">
+              <a:buFont typeface="Arial" panose="020B0604020202020204" pitchFamily="34" charset="0"/>
+              <a:buChar char="•"/>
+            </a:pPr>
+            <a:r>
+              <a:rPr lang="en-US" dirty="0"/>
+              <a:t>Notice how different PTI and BTI are between HERE and Bluetooth?</a:t>
+            </a:r>
+          </a:p>
+        </p:txBody>
+      </p:sp>
+      <p:pic>
+        <p:nvPicPr>
+          <p:cNvPr id="8" name="Content Placeholder 7"/>
+          <p:cNvPicPr>
+            <a:picLocks noGrp="1" noChangeAspect="1"/>
+          </p:cNvPicPr>
           <p:nvPr>
             <p:ph idx="1"/>
           </p:nvPr>
-        </p:nvSpPr>
-        <p:spPr/>
-        <p:txBody>
-          <a:bodyPr numCol="2"/>
-          <a:lstStyle/>
-          <a:p>
-            <a:r>
-              <a:rPr lang="en-US" dirty="0"/>
-              <a:t>Mean Speed</a:t>
-            </a:r>
-          </a:p>
-          <a:p>
-            <a:r>
-              <a:rPr lang="en-US" dirty="0"/>
-              <a:t>Standard Deviation</a:t>
-            </a:r>
-          </a:p>
-          <a:p>
-            <a:r>
-              <a:rPr lang="en-US" dirty="0"/>
-              <a:t>% Coverage</a:t>
-            </a:r>
-            <a:endParaRPr lang="en-US" dirty="0"/>
-          </a:p>
-          <a:p>
-            <a:r>
-              <a:rPr lang="en-US" dirty="0"/>
-              <a:t>85</a:t>
-            </a:r>
-            <a:r>
-              <a:rPr lang="en-US" baseline="30000" dirty="0"/>
-              <a:t>th</a:t>
-            </a:r>
-            <a:r>
-              <a:rPr lang="en-US" dirty="0"/>
-              <a:t> percentile speed</a:t>
-            </a:r>
-          </a:p>
-          <a:p>
-            <a:r>
-              <a:rPr lang="en-US" dirty="0"/>
-              <a:t>5</a:t>
-            </a:r>
-            <a:r>
-              <a:rPr lang="en-US" baseline="30000" dirty="0"/>
-              <a:t>th</a:t>
-            </a:r>
-            <a:r>
-              <a:rPr lang="en-US" dirty="0"/>
-              <a:t> percentile speed</a:t>
-            </a:r>
-          </a:p>
-          <a:p>
-            <a:r>
-              <a:rPr lang="en-US" dirty="0"/>
-              <a:t>60</a:t>
-            </a:r>
-            <a:r>
-              <a:rPr lang="en-US" baseline="30000" dirty="0"/>
-              <a:t>th</a:t>
-            </a:r>
-            <a:r>
-              <a:rPr lang="en-US" dirty="0"/>
-              <a:t> percentile speed</a:t>
-            </a:r>
-          </a:p>
-          <a:p>
-            <a:endParaRPr lang="en-US" dirty="0"/>
-          </a:p>
-          <a:p>
-            <a:pPr marL="45720" indent="0">
-              <a:buNone/>
-            </a:pPr>
-            <a:endParaRPr lang="en-US" dirty="0"/>
-          </a:p>
-          <a:p>
-            <a:r>
-              <a:rPr lang="en-US" dirty="0"/>
-              <a:t>TTI</a:t>
-            </a:r>
-          </a:p>
-          <a:p>
-            <a:r>
-              <a:rPr lang="en-US" dirty="0"/>
-              <a:t>PTI</a:t>
-            </a:r>
-          </a:p>
-          <a:p>
-            <a:r>
-              <a:rPr lang="en-US" dirty="0"/>
-              <a:t>BTI (Buffer Index)</a:t>
-            </a:r>
-          </a:p>
-          <a:p>
-            <a:r>
-              <a:rPr lang="en-US" dirty="0"/>
-              <a:t>Pair plots between Mean and Epoch (5-min intervals)</a:t>
-            </a:r>
-          </a:p>
-          <a:p>
-            <a:pPr marL="45720" indent="0">
-              <a:buNone/>
-            </a:pPr>
-            <a:endParaRPr lang="en-US" dirty="0"/>
-          </a:p>
-        </p:txBody>
-      </p:sp>
+        </p:nvPicPr>
+        <p:blipFill>
+          <a:blip r:embed="rId2"/>
+          <a:stretch>
+            <a:fillRect/>
+          </a:stretch>
+        </p:blipFill>
+        <p:spPr>
+          <a:xfrm>
+            <a:off x="3863625" y="1734671"/>
+            <a:ext cx="8053153" cy="4038600"/>
+          </a:xfrm>
+          <a:prstGeom prst="rect">
+            <a:avLst/>
+          </a:prstGeom>
+        </p:spPr>
+      </p:pic>
     </p:spTree>
     <p:extLst>
       <p:ext uri="{BB962C8B-B14F-4D97-AF65-F5344CB8AC3E}">
-        <p14:creationId xmlns:p14="http://schemas.microsoft.com/office/powerpoint/2010/main" val="186715008"/>
+        <p14:creationId xmlns:p14="http://schemas.microsoft.com/office/powerpoint/2010/main" val="3863283504"/>
       </p:ext>
     </p:extLst>
   </p:cSld>
@@ -3641,21 +3594,32 @@
             <p:ph type="title"/>
           </p:nvPr>
         </p:nvSpPr>
-        <p:spPr/>
-        <p:txBody>
-          <a:bodyPr/>
-          <a:lstStyle/>
-          <a:p>
-            <a:r>
-              <a:rPr lang="en-US" dirty="0"/>
-              <a:t>Richmond Road to Alumni</a:t>
+        <p:spPr>
+          <a:xfrm>
+            <a:off x="1143000" y="609600"/>
+            <a:ext cx="9875520" cy="502024"/>
+          </a:xfrm>
+        </p:spPr>
+        <p:txBody>
+          <a:bodyPr>
+            <a:normAutofit fontScale="90000"/>
+          </a:bodyPr>
+          <a:lstStyle/>
+          <a:p>
+            <a:r>
+              <a:rPr lang="en-US" dirty="0" err="1"/>
+              <a:t>Pairplots</a:t>
+            </a:r>
+            <a:r>
+              <a:rPr lang="en-US" dirty="0"/>
+              <a:t>: Richmond Road to Alumni</a:t>
             </a:r>
           </a:p>
         </p:txBody>
       </p:sp>
       <p:pic>
         <p:nvPicPr>
-          <p:cNvPr id="8" name="Content Placeholder 7"/>
+          <p:cNvPr id="5" name="Content Placeholder 4"/>
           <p:cNvPicPr>
             <a:picLocks noGrp="1" noChangeAspect="1"/>
           </p:cNvPicPr>
@@ -3664,97 +3628,118 @@
           </p:nvPr>
         </p:nvPicPr>
         <p:blipFill>
-          <a:blip r:embed="rId2"/>
+          <a:blip r:embed="rId2">
+            <a:extLst>
+              <a:ext uri="{28A0092B-C50C-407E-A947-70E740481C1C}">
+                <a14:useLocalDpi xmlns:a14="http://schemas.microsoft.com/office/drawing/2010/main" val="0"/>
+              </a:ext>
+            </a:extLst>
+          </a:blip>
           <a:stretch>
             <a:fillRect/>
           </a:stretch>
         </p:blipFill>
         <p:spPr>
           <a:xfrm>
-            <a:off x="4098784" y="2045970"/>
-            <a:ext cx="7664414" cy="4038600"/>
+            <a:off x="354106" y="1534592"/>
+            <a:ext cx="5661650" cy="5017712"/>
+          </a:xfrm>
+        </p:spPr>
+      </p:pic>
+      <p:sp>
+        <p:nvSpPr>
+          <p:cNvPr id="6" name="TextBox 5"/>
+          <p:cNvSpPr txBox="1"/>
+          <p:nvPr/>
+        </p:nvSpPr>
+        <p:spPr>
+          <a:xfrm>
+            <a:off x="1632470" y="1165260"/>
+            <a:ext cx="3104921" cy="369332"/>
+          </a:xfrm>
+          <a:prstGeom prst="rect">
+            <a:avLst/>
+          </a:prstGeom>
+          <a:noFill/>
+        </p:spPr>
+        <p:txBody>
+          <a:bodyPr wrap="square" rtlCol="0">
+            <a:spAutoFit/>
+          </a:bodyPr>
+          <a:lstStyle/>
+          <a:p>
+            <a:pPr algn="ctr"/>
+            <a:r>
+              <a:rPr lang="en-US" dirty="0"/>
+              <a:t>HERE: Weekday Non-Holiday</a:t>
+            </a:r>
+          </a:p>
+        </p:txBody>
+      </p:sp>
+      <p:sp>
+        <p:nvSpPr>
+          <p:cNvPr id="7" name="TextBox 6"/>
+          <p:cNvSpPr txBox="1"/>
+          <p:nvPr/>
+        </p:nvSpPr>
+        <p:spPr>
+          <a:xfrm>
+            <a:off x="7419140" y="1165260"/>
+            <a:ext cx="3724400" cy="369332"/>
+          </a:xfrm>
+          <a:prstGeom prst="rect">
+            <a:avLst/>
+          </a:prstGeom>
+          <a:noFill/>
+        </p:spPr>
+        <p:txBody>
+          <a:bodyPr wrap="square" rtlCol="0">
+            <a:spAutoFit/>
+          </a:bodyPr>
+          <a:lstStyle/>
+          <a:p>
+            <a:pPr algn="ctr"/>
+            <a:r>
+              <a:rPr lang="en-US" dirty="0"/>
+              <a:t>Bluetooth: Weekday Non-Holiday</a:t>
+            </a:r>
+          </a:p>
+        </p:txBody>
+      </p:sp>
+      <p:pic>
+        <p:nvPicPr>
+          <p:cNvPr id="8" name="Picture 7"/>
+          <p:cNvPicPr>
+            <a:picLocks noChangeAspect="1"/>
+          </p:cNvPicPr>
+          <p:nvPr/>
+        </p:nvPicPr>
+        <p:blipFill>
+          <a:blip r:embed="rId3">
+            <a:extLst>
+              <a:ext uri="{28A0092B-C50C-407E-A947-70E740481C1C}">
+                <a14:useLocalDpi xmlns:a14="http://schemas.microsoft.com/office/drawing/2010/main" val="0"/>
+              </a:ext>
+            </a:extLst>
+          </a:blip>
+          <a:stretch>
+            <a:fillRect/>
+          </a:stretch>
+        </p:blipFill>
+        <p:spPr>
+          <a:xfrm>
+            <a:off x="6642847" y="1534592"/>
+            <a:ext cx="5276986" cy="5084028"/>
           </a:xfrm>
           <a:prstGeom prst="rect">
             <a:avLst/>
           </a:prstGeom>
         </p:spPr>
       </p:pic>
-      <p:sp>
-        <p:nvSpPr>
-          <p:cNvPr id="9" name="TextBox 8"/>
-          <p:cNvSpPr txBox="1"/>
-          <p:nvPr/>
-        </p:nvSpPr>
-        <p:spPr>
-          <a:xfrm>
-            <a:off x="1143000" y="2286000"/>
-            <a:ext cx="2526030" cy="2862322"/>
-          </a:xfrm>
-          <a:prstGeom prst="rect">
-            <a:avLst/>
-          </a:prstGeom>
-          <a:noFill/>
-        </p:spPr>
-        <p:txBody>
-          <a:bodyPr wrap="square" rtlCol="0">
-            <a:spAutoFit/>
-          </a:bodyPr>
-          <a:lstStyle/>
-          <a:p>
-            <a:r>
-              <a:rPr lang="en-US" dirty="0"/>
-              <a:t>Notes:</a:t>
-            </a:r>
-          </a:p>
-          <a:p>
-            <a:endParaRPr lang="en-US" dirty="0"/>
-          </a:p>
-          <a:p>
-            <a:pPr marL="285750" indent="-285750">
-              <a:buFont typeface="Arial" panose="020B0604020202020204" pitchFamily="34" charset="0"/>
-              <a:buChar char="•"/>
-            </a:pPr>
-            <a:r>
-              <a:rPr lang="en-US" dirty="0" err="1"/>
-              <a:t>Pct</a:t>
-            </a:r>
-            <a:r>
-              <a:rPr lang="en-US" dirty="0"/>
-              <a:t> Intervals for HERE is by link.  </a:t>
-            </a:r>
-            <a:r>
-              <a:rPr lang="en-US" dirty="0" err="1"/>
-              <a:t>Pct</a:t>
-            </a:r>
-            <a:r>
-              <a:rPr lang="en-US" dirty="0"/>
-              <a:t> Intervals for Bluetooth is by segment</a:t>
-            </a:r>
-          </a:p>
-          <a:p>
-            <a:pPr marL="285750" indent="-285750">
-              <a:buFont typeface="Arial" panose="020B0604020202020204" pitchFamily="34" charset="0"/>
-              <a:buChar char="•"/>
-            </a:pPr>
-            <a:r>
-              <a:rPr lang="en-US" dirty="0"/>
-              <a:t>HERE 60</a:t>
-            </a:r>
-            <a:r>
-              <a:rPr lang="en-US" baseline="30000" dirty="0"/>
-              <a:t>th</a:t>
-            </a:r>
-            <a:r>
-              <a:rPr lang="en-US" dirty="0"/>
-              <a:t> speed is calculated between 6AM and 8PM</a:t>
-            </a:r>
-          </a:p>
-        </p:txBody>
-      </p:sp>
     </p:spTree>
     <p:extLst>
       <p:ext uri="{BB962C8B-B14F-4D97-AF65-F5344CB8AC3E}">
-        <p14:creationId xmlns:p14="http://schemas.microsoft.com/office/powerpoint/2010/main" val="2675078279"/>
+        <p14:creationId xmlns:p14="http://schemas.microsoft.com/office/powerpoint/2010/main" val="3650496424"/>
       </p:ext>
     </p:extLst>
   </p:cSld>
@@ -3797,49 +3782,86 @@
           <a:lstStyle/>
           <a:p>
             <a:r>
-              <a:rPr lang="en-US" dirty="0"/>
-              <a:t>Richmond Road to Alumni</a:t>
-            </a:r>
-            <a:endParaRPr lang="en-US" dirty="0"/>
+              <a:rPr lang="en-US" dirty="0" err="1"/>
+              <a:t>Pairplots</a:t>
+            </a:r>
+            <a:r>
+              <a:rPr lang="en-US" dirty="0"/>
+              <a:t>: Richmond Road to Alumni</a:t>
+            </a:r>
           </a:p>
         </p:txBody>
       </p:sp>
       <p:pic>
         <p:nvPicPr>
-          <p:cNvPr id="4" name="Content Placeholder 3"/>
+          <p:cNvPr id="4" name="Picture 3"/>
           <p:cNvPicPr>
-            <a:picLocks noGrp="1" noChangeAspect="1"/>
+            <a:picLocks noChangeAspect="1"/>
           </p:cNvPicPr>
-          <p:nvPr>
-            <p:ph idx="1"/>
-          </p:nvPr>
+          <p:nvPr/>
         </p:nvPicPr>
         <p:blipFill>
-          <a:blip r:embed="rId2"/>
+          <a:blip r:embed="rId2">
+            <a:extLst>
+              <a:ext uri="{28A0092B-C50C-407E-A947-70E740481C1C}">
+                <a14:useLocalDpi xmlns:a14="http://schemas.microsoft.com/office/drawing/2010/main" val="0"/>
+              </a:ext>
+            </a:extLst>
+          </a:blip>
           <a:stretch>
             <a:fillRect/>
           </a:stretch>
         </p:blipFill>
         <p:spPr>
           <a:xfrm>
-            <a:off x="3989070" y="2251710"/>
-            <a:ext cx="7536330" cy="3427326"/>
+            <a:off x="5942246" y="2951622"/>
+            <a:ext cx="5988314" cy="3619802"/>
           </a:xfrm>
           <a:prstGeom prst="rect">
             <a:avLst/>
           </a:prstGeom>
         </p:spPr>
       </p:pic>
-      <p:sp>
-        <p:nvSpPr>
-          <p:cNvPr id="5" name="TextBox 4"/>
+      <p:pic>
+        <p:nvPicPr>
+          <p:cNvPr id="9" name="Picture 8"/>
+          <p:cNvPicPr>
+            <a:picLocks noChangeAspect="1"/>
+          </p:cNvPicPr>
+          <p:nvPr/>
+        </p:nvPicPr>
+        <p:blipFill>
+          <a:blip r:embed="rId3">
+            <a:extLst>
+              <a:ext uri="{28A0092B-C50C-407E-A947-70E740481C1C}">
+                <a14:useLocalDpi xmlns:a14="http://schemas.microsoft.com/office/drawing/2010/main" val="0"/>
+              </a:ext>
+            </a:extLst>
+          </a:blip>
+          <a:stretch>
+            <a:fillRect/>
+          </a:stretch>
+        </p:blipFill>
+        <p:spPr>
+          <a:xfrm>
+            <a:off x="266586" y="2900068"/>
+            <a:ext cx="5814174" cy="3722910"/>
+          </a:xfrm>
+          <a:prstGeom prst="rect">
+            <a:avLst/>
+          </a:prstGeom>
+        </p:spPr>
+      </p:pic>
+      <p:sp>
+        <p:nvSpPr>
+          <p:cNvPr id="8" name="TextBox 7"/>
           <p:cNvSpPr txBox="1"/>
           <p:nvPr/>
         </p:nvSpPr>
         <p:spPr>
           <a:xfrm>
-            <a:off x="1143000" y="2251710"/>
-            <a:ext cx="2114550" cy="2031325"/>
+            <a:off x="1621212" y="2397624"/>
+            <a:ext cx="3104921" cy="369332"/>
           </a:xfrm>
           <a:prstGeom prst="rect">
             <a:avLst/>
@@ -3852,22 +3874,40 @@
           </a:bodyPr>
           <a:lstStyle/>
           <a:p>
-            <a:r>
-              <a:rPr lang="en-US" dirty="0"/>
-              <a:t>Notes:</a:t>
-            </a:r>
-          </a:p>
-          <a:p>
-            <a:endParaRPr lang="en-US" dirty="0"/>
-          </a:p>
-          <a:p>
-            <a:pPr marL="285750" indent="-285750">
-              <a:buFont typeface="Arial" panose="020B0604020202020204" pitchFamily="34" charset="0"/>
-              <a:buChar char="•"/>
-            </a:pPr>
-            <a:r>
-              <a:rPr lang="en-US" dirty="0"/>
-              <a:t>Notice how different PIT and BTI are between HERE and Bluetooth?</a:t>
+            <a:pPr algn="ctr"/>
+            <a:r>
+              <a:rPr lang="en-US" dirty="0"/>
+              <a:t>HERE: Weekday Non-Holiday</a:t>
+            </a:r>
+          </a:p>
+        </p:txBody>
+      </p:sp>
+      <p:sp>
+        <p:nvSpPr>
+          <p:cNvPr id="10" name="TextBox 9"/>
+          <p:cNvSpPr txBox="1"/>
+          <p:nvPr/>
+        </p:nvSpPr>
+        <p:spPr>
+          <a:xfrm>
+            <a:off x="7074203" y="2397624"/>
+            <a:ext cx="3724400" cy="369332"/>
+          </a:xfrm>
+          <a:prstGeom prst="rect">
+            <a:avLst/>
+          </a:prstGeom>
+          <a:noFill/>
+        </p:spPr>
+        <p:txBody>
+          <a:bodyPr wrap="square" rtlCol="0">
+            <a:spAutoFit/>
+          </a:bodyPr>
+          <a:lstStyle/>
+          <a:p>
+            <a:pPr algn="ctr"/>
+            <a:r>
+              <a:rPr lang="en-US" dirty="0"/>
+              <a:t>Bluetooth: Weekday Non-Holiday</a:t>
             </a:r>
           </a:p>
         </p:txBody>
@@ -3875,7 +3915,7 @@
     </p:spTree>
     <p:extLst>
       <p:ext uri="{BB962C8B-B14F-4D97-AF65-F5344CB8AC3E}">
-        <p14:creationId xmlns:p14="http://schemas.microsoft.com/office/powerpoint/2010/main" val="3863283504"/>
+        <p14:creationId xmlns:p14="http://schemas.microsoft.com/office/powerpoint/2010/main" val="3297271625"/>
       </p:ext>
     </p:extLst>
   </p:cSld>
@@ -3939,6 +3979,66 @@
           <a:bodyPr/>
           <a:lstStyle/>
           <a:p>
+            <a:r>
+              <a:rPr lang="en-US" dirty="0"/>
+              <a:t>Probe GPS data tends to show lower 5</a:t>
+            </a:r>
+            <a:r>
+              <a:rPr lang="en-US" baseline="30000" dirty="0"/>
+              <a:t>th</a:t>
+            </a:r>
+            <a:r>
+              <a:rPr lang="en-US" dirty="0"/>
+              <a:t> percent speeds than Bluetooth Data.</a:t>
+            </a:r>
+          </a:p>
+          <a:p>
+            <a:pPr lvl="1"/>
+            <a:r>
+              <a:rPr lang="en-US" dirty="0"/>
+              <a:t>Also leads to Higher PTI’s</a:t>
+            </a:r>
+          </a:p>
+          <a:p>
+            <a:r>
+              <a:rPr lang="en-US" dirty="0"/>
+              <a:t>Probe GPS Mean speed at times seems lower than Bluetooth speeds.</a:t>
+            </a:r>
+          </a:p>
+          <a:p>
+            <a:pPr lvl="1"/>
+            <a:r>
+              <a:rPr lang="en-US" dirty="0"/>
+              <a:t>Alumni-Richmond</a:t>
+            </a:r>
+          </a:p>
+          <a:p>
+            <a:pPr lvl="1"/>
+            <a:r>
+              <a:rPr lang="en-US" dirty="0"/>
+              <a:t>Richmond-Alumni</a:t>
+            </a:r>
+          </a:p>
+          <a:p>
+            <a:pPr lvl="1"/>
+            <a:r>
+              <a:rPr lang="en-US" dirty="0"/>
+              <a:t>Richmond-</a:t>
+            </a:r>
+            <a:r>
+              <a:rPr lang="en-US" dirty="0" err="1"/>
+              <a:t>Todds</a:t>
+            </a:r>
+            <a:endParaRPr lang="en-US" dirty="0"/>
+          </a:p>
+          <a:p>
+            <a:endParaRPr lang="en-US" dirty="0"/>
+          </a:p>
+          <a:p>
+            <a:pPr lvl="1"/>
+            <a:endParaRPr lang="en-US" dirty="0"/>
+          </a:p>
+          <a:p>
             <a:endParaRPr lang="en-US" dirty="0"/>
           </a:p>
         </p:txBody>
@@ -3957,6 +4057,106 @@
 </file>
 
 <file path=ppt/slides/slide14.xml><?xml version="1.0" encoding="utf-8"?>
+<p:sld xmlns:a="http://schemas.openxmlformats.org/drawingml/2006/main" xmlns:r="http://schemas.openxmlformats.org/officeDocument/2006/relationships" xmlns:p="http://schemas.openxmlformats.org/presentationml/2006/main">
+  <p:cSld>
+    <p:spTree>
+      <p:nvGrpSpPr>
+        <p:cNvPr id="1" name=""/>
+        <p:cNvGrpSpPr/>
+        <p:nvPr/>
+      </p:nvGrpSpPr>
+      <p:grpSpPr>
+        <a:xfrm>
+          <a:off x="0" y="0"/>
+          <a:ext cx="0" cy="0"/>
+          <a:chOff x="0" y="0"/>
+          <a:chExt cx="0" cy="0"/>
+        </a:xfrm>
+      </p:grpSpPr>
+      <p:sp>
+        <p:nvSpPr>
+          <p:cNvPr id="2" name="Title 1"/>
+          <p:cNvSpPr>
+            <a:spLocks noGrp="1"/>
+          </p:cNvSpPr>
+          <p:nvPr>
+            <p:ph type="title"/>
+          </p:nvPr>
+        </p:nvSpPr>
+        <p:spPr/>
+        <p:txBody>
+          <a:bodyPr/>
+          <a:lstStyle/>
+          <a:p>
+            <a:r>
+              <a:rPr lang="en-US" dirty="0"/>
+              <a:t>Next Steps</a:t>
+            </a:r>
+          </a:p>
+        </p:txBody>
+      </p:sp>
+      <p:sp>
+        <p:nvSpPr>
+          <p:cNvPr id="3" name="Content Placeholder 2"/>
+          <p:cNvSpPr>
+            <a:spLocks noGrp="1"/>
+          </p:cNvSpPr>
+          <p:nvPr>
+            <p:ph idx="1"/>
+          </p:nvPr>
+        </p:nvSpPr>
+        <p:spPr/>
+        <p:txBody>
+          <a:bodyPr/>
+          <a:lstStyle/>
+          <a:p>
+            <a:r>
+              <a:rPr lang="en-US" dirty="0"/>
+              <a:t>Perform more detailed statistical analysis between the datasets</a:t>
+            </a:r>
+          </a:p>
+          <a:p>
+            <a:r>
+              <a:rPr lang="en-US" dirty="0"/>
+              <a:t>Modify code to handle larger datasets</a:t>
+            </a:r>
+          </a:p>
+          <a:p>
+            <a:r>
+              <a:rPr lang="en-US" dirty="0"/>
+              <a:t>Thesis Ideas:</a:t>
+            </a:r>
+          </a:p>
+          <a:p>
+            <a:pPr lvl="1"/>
+            <a:r>
+              <a:rPr lang="en-US" dirty="0"/>
+              <a:t>Explore more detailed analysis of congestion at Work Zones using Probe GPS and Bluetooth Data</a:t>
+            </a:r>
+          </a:p>
+          <a:p>
+            <a:pPr lvl="1"/>
+            <a:r>
+              <a:rPr lang="en-US" dirty="0"/>
+              <a:t>Consider data fusion between HERE and Bluetooth data for more robust datasets.</a:t>
+            </a:r>
+          </a:p>
+        </p:txBody>
+      </p:sp>
+    </p:spTree>
+    <p:extLst>
+      <p:ext uri="{BB962C8B-B14F-4D97-AF65-F5344CB8AC3E}">
+        <p14:creationId xmlns:p14="http://schemas.microsoft.com/office/powerpoint/2010/main" val="1709086806"/>
+      </p:ext>
+    </p:extLst>
+  </p:cSld>
+  <p:clrMapOvr>
+    <a:masterClrMapping/>
+  </p:clrMapOvr>
+</p:sld>
+</file>
+
+<file path=ppt/slides/slide15.xml><?xml version="1.0" encoding="utf-8"?>
 <p:sld xmlns:a="http://schemas.openxmlformats.org/drawingml/2006/main" xmlns:r="http://schemas.openxmlformats.org/officeDocument/2006/relationships" xmlns:p="http://schemas.openxmlformats.org/presentationml/2006/main">
   <p:cSld>
     <p:spTree>
@@ -4033,6 +4233,99 @@
           <a:chExt cx="0" cy="0"/>
         </a:xfrm>
       </p:grpSpPr>
+      <p:sp>
+        <p:nvSpPr>
+          <p:cNvPr id="2" name="Title 1"/>
+          <p:cNvSpPr>
+            <a:spLocks noGrp="1"/>
+          </p:cNvSpPr>
+          <p:nvPr>
+            <p:ph type="title"/>
+          </p:nvPr>
+        </p:nvSpPr>
+        <p:spPr/>
+        <p:txBody>
+          <a:bodyPr/>
+          <a:lstStyle/>
+          <a:p>
+            <a:r>
+              <a:rPr lang="en-US" dirty="0"/>
+              <a:t>What I Proposed</a:t>
+            </a:r>
+          </a:p>
+        </p:txBody>
+      </p:sp>
+      <p:sp>
+        <p:nvSpPr>
+          <p:cNvPr id="3" name="Content Placeholder 2"/>
+          <p:cNvSpPr>
+            <a:spLocks noGrp="1"/>
+          </p:cNvSpPr>
+          <p:nvPr>
+            <p:ph idx="1"/>
+          </p:nvPr>
+        </p:nvSpPr>
+        <p:spPr/>
+        <p:txBody>
+          <a:bodyPr/>
+          <a:lstStyle/>
+          <a:p>
+            <a:r>
+              <a:rPr lang="en-US" dirty="0"/>
+              <a:t>Develop a process to format GPS data to corridor-level speeds comparable to Bluetooth data</a:t>
+            </a:r>
+          </a:p>
+          <a:p>
+            <a:pPr lvl="1"/>
+            <a:r>
+              <a:rPr lang="en-US" dirty="0"/>
+              <a:t>Come up with a quicker way to calculate HERE Statistics than what is currently Implemented</a:t>
+            </a:r>
+          </a:p>
+          <a:p>
+            <a:r>
+              <a:rPr lang="en-US" dirty="0"/>
+              <a:t>Perform basic comparisons to see how the data are similar/different</a:t>
+            </a:r>
+          </a:p>
+          <a:p>
+            <a:r>
+              <a:rPr lang="en-US" dirty="0"/>
+              <a:t>Compare the strengths and weaknesses of the data collection methods and relate the findings to the speed data collected along Man O War</a:t>
+            </a:r>
+          </a:p>
+        </p:txBody>
+      </p:sp>
+    </p:spTree>
+    <p:extLst>
+      <p:ext uri="{BB962C8B-B14F-4D97-AF65-F5344CB8AC3E}">
+        <p14:creationId xmlns:p14="http://schemas.microsoft.com/office/powerpoint/2010/main" val="890917192"/>
+      </p:ext>
+    </p:extLst>
+  </p:cSld>
+  <p:clrMapOvr>
+    <a:masterClrMapping/>
+  </p:clrMapOvr>
+</p:sld>
+</file>
+
+<file path=ppt/slides/slide3.xml><?xml version="1.0" encoding="utf-8"?>
+<p:sld xmlns:a="http://schemas.openxmlformats.org/drawingml/2006/main" xmlns:r="http://schemas.openxmlformats.org/officeDocument/2006/relationships" xmlns:p="http://schemas.openxmlformats.org/presentationml/2006/main">
+  <p:cSld>
+    <p:spTree>
+      <p:nvGrpSpPr>
+        <p:cNvPr id="1" name=""/>
+        <p:cNvGrpSpPr/>
+        <p:nvPr/>
+      </p:nvGrpSpPr>
+      <p:grpSpPr>
+        <a:xfrm>
+          <a:off x="0" y="0"/>
+          <a:ext cx="0" cy="0"/>
+          <a:chOff x="0" y="0"/>
+          <a:chExt cx="0" cy="0"/>
+        </a:xfrm>
+      </p:grpSpPr>
       <p:pic>
         <p:nvPicPr>
           <p:cNvPr id="4" name="Content Placeholder 3"/>
@@ -4044,7 +4337,7 @@
           </p:nvPr>
         </p:nvPicPr>
         <p:blipFill>
-          <a:blip r:embed="rId2">
+          <a:blip r:embed="rId2" cstate="hqprint">
             <a:extLst>
               <a:ext uri="{28A0092B-C50C-407E-A947-70E740481C1C}">
                 <a14:useLocalDpi xmlns:a14="http://schemas.microsoft.com/office/drawing/2010/main" val="0"/>
@@ -4075,115 +4368,6 @@
 </p:sld>
 </file>
 
-<file path=ppt/slides/slide3.xml><?xml version="1.0" encoding="utf-8"?>
-<p:sld xmlns:a="http://schemas.openxmlformats.org/drawingml/2006/main" xmlns:r="http://schemas.openxmlformats.org/officeDocument/2006/relationships" xmlns:p="http://schemas.openxmlformats.org/presentationml/2006/main">
-  <p:cSld>
-    <p:spTree>
-      <p:nvGrpSpPr>
-        <p:cNvPr id="1" name=""/>
-        <p:cNvGrpSpPr/>
-        <p:nvPr/>
-      </p:nvGrpSpPr>
-      <p:grpSpPr>
-        <a:xfrm>
-          <a:off x="0" y="0"/>
-          <a:ext cx="0" cy="0"/>
-          <a:chOff x="0" y="0"/>
-          <a:chExt cx="0" cy="0"/>
-        </a:xfrm>
-      </p:grpSpPr>
-      <p:sp>
-        <p:nvSpPr>
-          <p:cNvPr id="2" name="Title 1"/>
-          <p:cNvSpPr>
-            <a:spLocks noGrp="1"/>
-          </p:cNvSpPr>
-          <p:nvPr>
-            <p:ph type="title"/>
-          </p:nvPr>
-        </p:nvSpPr>
-        <p:spPr/>
-        <p:txBody>
-          <a:bodyPr/>
-          <a:lstStyle/>
-          <a:p>
-            <a:r>
-              <a:rPr lang="en-US" dirty="0"/>
-              <a:t>What are the Differences?</a:t>
-            </a:r>
-          </a:p>
-        </p:txBody>
-      </p:sp>
-      <p:sp>
-        <p:nvSpPr>
-          <p:cNvPr id="3" name="Content Placeholder 2"/>
-          <p:cNvSpPr>
-            <a:spLocks noGrp="1"/>
-          </p:cNvSpPr>
-          <p:nvPr>
-            <p:ph idx="1"/>
-          </p:nvPr>
-        </p:nvSpPr>
-        <p:spPr>
-          <a:xfrm>
-            <a:off x="838200" y="1825625"/>
-            <a:ext cx="10515600" cy="927002"/>
-          </a:xfrm>
-        </p:spPr>
-        <p:txBody>
-          <a:bodyPr/>
-          <a:lstStyle/>
-          <a:p>
-            <a:r>
-              <a:rPr lang="en-US" dirty="0"/>
-              <a:t>Bluetooth – Uses Bluetooth Sensors in phones and other devices to track and monitor traffic</a:t>
-            </a:r>
-          </a:p>
-        </p:txBody>
-      </p:sp>
-      <p:pic>
-        <p:nvPicPr>
-          <p:cNvPr id="4" name="Picture 3"/>
-          <p:cNvPicPr>
-            <a:picLocks noChangeAspect="1"/>
-          </p:cNvPicPr>
-          <p:nvPr/>
-        </p:nvPicPr>
-        <p:blipFill>
-          <a:blip r:embed="rId2">
-            <a:extLst>
-              <a:ext uri="{28A0092B-C50C-407E-A947-70E740481C1C}">
-                <a14:useLocalDpi xmlns:a14="http://schemas.microsoft.com/office/drawing/2010/main" val="0"/>
-              </a:ext>
-            </a:extLst>
-          </a:blip>
-          <a:stretch>
-            <a:fillRect/>
-          </a:stretch>
-        </p:blipFill>
-        <p:spPr>
-          <a:xfrm>
-            <a:off x="2566724" y="2581177"/>
-            <a:ext cx="7058552" cy="3970435"/>
-          </a:xfrm>
-          <a:prstGeom prst="rect">
-            <a:avLst/>
-          </a:prstGeom>
-        </p:spPr>
-      </p:pic>
-    </p:spTree>
-    <p:extLst>
-      <p:ext uri="{BB962C8B-B14F-4D97-AF65-F5344CB8AC3E}">
-        <p14:creationId xmlns:p14="http://schemas.microsoft.com/office/powerpoint/2010/main" val="3871478100"/>
-      </p:ext>
-    </p:extLst>
-  </p:cSld>
-  <p:clrMapOvr>
-    <a:masterClrMapping/>
-  </p:clrMapOvr>
-</p:sld>
-</file>
-
 <file path=ppt/slides/slide4.xml><?xml version="1.0" encoding="utf-8"?>
 <p:sld xmlns:a="http://schemas.openxmlformats.org/drawingml/2006/main" xmlns:r="http://schemas.openxmlformats.org/officeDocument/2006/relationships" xmlns:p="http://schemas.openxmlformats.org/presentationml/2006/main">
   <p:cSld>
@@ -4218,7 +4402,7 @@
           <a:p>
             <a:r>
               <a:rPr lang="en-US" dirty="0"/>
-              <a:t>What are the Differences?</a:t>
+              <a:t>The Datasets</a:t>
             </a:r>
           </a:p>
         </p:txBody>
@@ -4233,57 +4417,48 @@
             <p:ph idx="1"/>
           </p:nvPr>
         </p:nvSpPr>
-        <p:spPr>
-          <a:xfrm>
-            <a:off x="838200" y="1825625"/>
-            <a:ext cx="10515600" cy="531076"/>
-          </a:xfrm>
-        </p:spPr>
-        <p:txBody>
-          <a:bodyPr/>
-          <a:lstStyle/>
-          <a:p>
-            <a:r>
-              <a:rPr lang="en-US" dirty="0"/>
-              <a:t>GPS: Uses GPS devices and smartphones to monitor speed</a:t>
-            </a:r>
-          </a:p>
-        </p:txBody>
-      </p:sp>
-      <p:pic>
-        <p:nvPicPr>
-          <p:cNvPr id="4" name="Picture 3"/>
-          <p:cNvPicPr>
-            <a:picLocks noChangeAspect="1"/>
-          </p:cNvPicPr>
-          <p:nvPr/>
-        </p:nvPicPr>
-        <p:blipFill>
-          <a:blip r:embed="rId2">
-            <a:extLst>
-              <a:ext uri="{28A0092B-C50C-407E-A947-70E740481C1C}">
-                <a14:useLocalDpi xmlns:a14="http://schemas.microsoft.com/office/drawing/2010/main" val="0"/>
-              </a:ext>
-            </a:extLst>
-          </a:blip>
-          <a:stretch>
-            <a:fillRect/>
-          </a:stretch>
-        </p:blipFill>
-        <p:spPr>
-          <a:xfrm>
-            <a:off x="2654977" y="2275989"/>
-            <a:ext cx="6882046" cy="4310873"/>
-          </a:xfrm>
-          <a:prstGeom prst="rect">
-            <a:avLst/>
-          </a:prstGeom>
-        </p:spPr>
-      </p:pic>
+        <p:spPr/>
+        <p:txBody>
+          <a:bodyPr/>
+          <a:lstStyle/>
+          <a:p>
+            <a:r>
+              <a:rPr lang="en-US" dirty="0"/>
+              <a:t>Year: 2015</a:t>
+            </a:r>
+          </a:p>
+          <a:p>
+            <a:endParaRPr lang="en-US" dirty="0"/>
+          </a:p>
+          <a:p>
+            <a:r>
+              <a:rPr lang="en-US" dirty="0"/>
+              <a:t>Bluetooth: Gives 5-minute speed data along segments on Man O War Blvd (</a:t>
+            </a:r>
+            <a:r>
+              <a:rPr lang="en-US" dirty="0" err="1"/>
+              <a:t>eg</a:t>
+            </a:r>
+            <a:r>
+              <a:rPr lang="en-US" dirty="0"/>
+              <a:t>. Richmond road to Alumni Drive)</a:t>
+            </a:r>
+          </a:p>
+          <a:p>
+            <a:endParaRPr lang="en-US" dirty="0"/>
+          </a:p>
+          <a:p>
+            <a:r>
+              <a:rPr lang="en-US" dirty="0"/>
+              <a:t>GPS: 5-Minute speed data along various links</a:t>
+            </a:r>
+          </a:p>
+        </p:txBody>
+      </p:sp>
     </p:spTree>
     <p:extLst>
       <p:ext uri="{BB962C8B-B14F-4D97-AF65-F5344CB8AC3E}">
-        <p14:creationId xmlns:p14="http://schemas.microsoft.com/office/powerpoint/2010/main" val="2713073937"/>
+        <p14:creationId xmlns:p14="http://schemas.microsoft.com/office/powerpoint/2010/main" val="1733475103"/>
       </p:ext>
     </p:extLst>
   </p:cSld>
@@ -4327,7 +4502,7 @@
           <a:p>
             <a:r>
               <a:rPr lang="en-US" dirty="0"/>
-              <a:t>The Datasets</a:t>
+              <a:t>What are the Differences?</a:t>
             </a:r>
           </a:p>
         </p:txBody>
@@ -4342,56 +4517,85 @@
             <p:ph idx="1"/>
           </p:nvPr>
         </p:nvSpPr>
-        <p:spPr/>
-        <p:txBody>
-          <a:bodyPr/>
-          <a:lstStyle/>
-          <a:p>
-            <a:r>
-              <a:rPr lang="en-US" dirty="0"/>
-              <a:t>Year: 2015</a:t>
-            </a:r>
-          </a:p>
-          <a:p>
-            <a:r>
-              <a:rPr lang="en-US" dirty="0"/>
-              <a:t>Bluetooth: Gives 5-minute speed data along segments on Man O War Blvd (</a:t>
-            </a:r>
-            <a:r>
-              <a:rPr lang="en-US" dirty="0" err="1"/>
-              <a:t>eg</a:t>
-            </a:r>
-            <a:r>
-              <a:rPr lang="en-US" dirty="0"/>
-              <a:t>. Richmond road to Alumni Drive)</a:t>
-            </a:r>
-          </a:p>
-          <a:p>
-            <a:r>
-              <a:rPr lang="en-US" dirty="0"/>
-              <a:t>GPS: 5-Minute speed data along various links</a:t>
+        <p:spPr>
+          <a:xfrm>
+            <a:off x="838200" y="1825625"/>
+            <a:ext cx="5212976" cy="4485528"/>
+          </a:xfrm>
+        </p:spPr>
+        <p:txBody>
+          <a:bodyPr/>
+          <a:lstStyle/>
+          <a:p>
+            <a:r>
+              <a:rPr lang="en-US" dirty="0"/>
+              <a:t>GPS: Uses GPS devices and smartphones to monitor speed</a:t>
+            </a:r>
+          </a:p>
+          <a:p>
+            <a:pPr marL="45720" indent="0">
+              <a:buNone/>
+            </a:pPr>
+            <a:endParaRPr lang="en-US" dirty="0"/>
+          </a:p>
+          <a:p>
+            <a:r>
+              <a:rPr lang="en-US" dirty="0"/>
+              <a:t>Great spatial coverage</a:t>
+            </a:r>
+          </a:p>
+          <a:p>
+            <a:endParaRPr lang="en-US" dirty="0"/>
+          </a:p>
+          <a:p>
+            <a:r>
+              <a:rPr lang="en-US" dirty="0"/>
+              <a:t>Smith</a:t>
             </a:r>
           </a:p>
           <a:p>
             <a:pPr lvl="1"/>
             <a:r>
               <a:rPr lang="en-US" dirty="0"/>
-              <a:t>Path-Based GPS</a:t>
-            </a:r>
-          </a:p>
-          <a:p>
-            <a:pPr lvl="1"/>
-            <a:r>
-              <a:rPr lang="en-US" dirty="0"/>
-              <a:t>Point-Based GPS</a:t>
-            </a:r>
-          </a:p>
-        </p:txBody>
-      </p:sp>
+              <a:t>Tends to record “Idle Speeds”</a:t>
+            </a:r>
+          </a:p>
+        </p:txBody>
+      </p:sp>
+      <p:pic>
+        <p:nvPicPr>
+          <p:cNvPr id="4" name="Picture 3"/>
+          <p:cNvPicPr>
+            <a:picLocks noChangeAspect="1"/>
+          </p:cNvPicPr>
+          <p:nvPr/>
+        </p:nvPicPr>
+        <p:blipFill>
+          <a:blip r:embed="rId2">
+            <a:extLst>
+              <a:ext uri="{28A0092B-C50C-407E-A947-70E740481C1C}">
+                <a14:useLocalDpi xmlns:a14="http://schemas.microsoft.com/office/drawing/2010/main" val="0"/>
+              </a:ext>
+            </a:extLst>
+          </a:blip>
+          <a:stretch>
+            <a:fillRect/>
+          </a:stretch>
+        </p:blipFill>
+        <p:spPr>
+          <a:xfrm>
+            <a:off x="6195151" y="2356701"/>
+            <a:ext cx="5735447" cy="3592650"/>
+          </a:xfrm>
+          <a:prstGeom prst="rect">
+            <a:avLst/>
+          </a:prstGeom>
+        </p:spPr>
+      </p:pic>
     </p:spTree>
     <p:extLst>
       <p:ext uri="{BB962C8B-B14F-4D97-AF65-F5344CB8AC3E}">
-        <p14:creationId xmlns:p14="http://schemas.microsoft.com/office/powerpoint/2010/main" val="1733475103"/>
+        <p14:creationId xmlns:p14="http://schemas.microsoft.com/office/powerpoint/2010/main" val="2713073937"/>
       </p:ext>
     </p:extLst>
   </p:cSld>
@@ -4435,7 +4639,7 @@
           <a:p>
             <a:r>
               <a:rPr lang="en-US" dirty="0"/>
-              <a:t>Goals</a:t>
+              <a:t>What are the Differences?</a:t>
             </a:r>
           </a:p>
         </p:txBody>
@@ -4450,40 +4654,87 @@
             <p:ph idx="1"/>
           </p:nvPr>
         </p:nvSpPr>
-        <p:spPr/>
-        <p:txBody>
-          <a:bodyPr/>
-          <a:lstStyle/>
-          <a:p>
-            <a:r>
-              <a:rPr lang="en-US" dirty="0"/>
-              <a:t>Develop a process to convert GPS data over to corridor-level speeds comparable to Bluetooth data</a:t>
-            </a:r>
-          </a:p>
-          <a:p>
-            <a:r>
-              <a:rPr lang="en-US" dirty="0"/>
-              <a:t>Perform basic comparisons to see how the data compares to each other</a:t>
-            </a:r>
-          </a:p>
-          <a:p>
-            <a:r>
-              <a:rPr lang="en-US" dirty="0"/>
-              <a:t>Compare the strengths and weaknesses of the data collection methods and relate the findings to the speed data collected along Man O War</a:t>
-            </a:r>
-          </a:p>
-          <a:p>
-            <a:r>
-              <a:rPr lang="en-US" dirty="0"/>
-              <a:t>Come up with a quicker way to calculate HERE Statistics than what is currently Implemented.</a:t>
-            </a:r>
-          </a:p>
-        </p:txBody>
-      </p:sp>
+        <p:spPr>
+          <a:xfrm>
+            <a:off x="838200" y="1825625"/>
+            <a:ext cx="5096435" cy="4691716"/>
+          </a:xfrm>
+        </p:spPr>
+        <p:txBody>
+          <a:bodyPr/>
+          <a:lstStyle/>
+          <a:p>
+            <a:r>
+              <a:rPr lang="en-US" dirty="0"/>
+              <a:t>Bluetooth – Uses Bluetooth Sensors in phones and other devices to track and monitor traffic</a:t>
+            </a:r>
+          </a:p>
+          <a:p>
+            <a:r>
+              <a:rPr lang="en-US" dirty="0" err="1"/>
+              <a:t>Haghani</a:t>
+            </a:r>
+            <a:r>
+              <a:rPr lang="en-US" dirty="0"/>
+              <a:t> et al. Introduced Bluetooth as a new “ground truth” by comparing Bluetooth travel time data to floating cars.</a:t>
+            </a:r>
+          </a:p>
+          <a:p>
+            <a:r>
+              <a:rPr lang="en-US" dirty="0"/>
+              <a:t>Smith</a:t>
+            </a:r>
+          </a:p>
+          <a:p>
+            <a:pPr lvl="1"/>
+            <a:r>
+              <a:rPr lang="en-US" dirty="0"/>
+              <a:t>Eliminates idle speed records by forcing vehicles to pass between two points</a:t>
+            </a:r>
+          </a:p>
+          <a:p>
+            <a:pPr lvl="1"/>
+            <a:r>
+              <a:rPr lang="en-US" dirty="0"/>
+              <a:t>500’ radius detection can cause issues when frontage roads exist.</a:t>
+            </a:r>
+          </a:p>
+        </p:txBody>
+      </p:sp>
+      <p:pic>
+        <p:nvPicPr>
+          <p:cNvPr id="4" name="Picture 3"/>
+          <p:cNvPicPr>
+            <a:picLocks noChangeAspect="1"/>
+          </p:cNvPicPr>
+          <p:nvPr/>
+        </p:nvPicPr>
+        <p:blipFill>
+          <a:blip r:embed="rId2">
+            <a:extLst>
+              <a:ext uri="{28A0092B-C50C-407E-A947-70E740481C1C}">
+                <a14:useLocalDpi xmlns:a14="http://schemas.microsoft.com/office/drawing/2010/main" val="0"/>
+              </a:ext>
+            </a:extLst>
+          </a:blip>
+          <a:stretch>
+            <a:fillRect/>
+          </a:stretch>
+        </p:blipFill>
+        <p:spPr>
+          <a:xfrm>
+            <a:off x="6080760" y="2752627"/>
+            <a:ext cx="5618052" cy="3160154"/>
+          </a:xfrm>
+          <a:prstGeom prst="rect">
+            <a:avLst/>
+          </a:prstGeom>
+        </p:spPr>
+      </p:pic>
     </p:spTree>
     <p:extLst>
       <p:ext uri="{BB962C8B-B14F-4D97-AF65-F5344CB8AC3E}">
-        <p14:creationId xmlns:p14="http://schemas.microsoft.com/office/powerpoint/2010/main" val="890917192"/>
+        <p14:creationId xmlns:p14="http://schemas.microsoft.com/office/powerpoint/2010/main" val="3871478100"/>
       </p:ext>
     </p:extLst>
   </p:cSld>
@@ -4549,11 +4800,7 @@
           <a:p>
             <a:r>
               <a:rPr lang="en-US" dirty="0"/>
-              <a:t>Research: “</a:t>
-            </a:r>
-            <a:r>
-              <a:rPr lang="en-US" dirty="0"/>
-              <a:t>Analysis of Historical Travel Time Data”</a:t>
+              <a:t>Research: “Analysis of Historical Travel Time Data” – Chen et al.</a:t>
             </a:r>
           </a:p>
           <a:p>
@@ -4572,7 +4819,7 @@
           <a:p>
             <a:r>
               <a:rPr lang="en-US" dirty="0"/>
-              <a:t>Used GIS data to create segment-level HERE stats by joining HERE Link statistics to GIS links.  </a:t>
+              <a:t>Used shapefile to create segment-level HERE stats by joining HERE Link statistics to GIS links.  </a:t>
             </a:r>
           </a:p>
           <a:p>
@@ -4650,140 +4897,134 @@
           <a:lstStyle/>
           <a:p>
             <a:r>
-              <a:rPr lang="en-US" dirty="0" err="1"/>
-              <a:t>Pairplots</a:t>
-            </a:r>
-            <a:r>
-              <a:rPr lang="en-US" dirty="0"/>
-              <a:t>: Richmond Road to Alumni</a:t>
-            </a:r>
+              <a:rPr lang="en-US" dirty="0"/>
+              <a:t>Metrics from Chen et al.</a:t>
+            </a:r>
+          </a:p>
+        </p:txBody>
+      </p:sp>
+      <p:sp>
+        <p:nvSpPr>
+          <p:cNvPr id="3" name="Content Placeholder 2"/>
+          <p:cNvSpPr>
+            <a:spLocks noGrp="1"/>
+          </p:cNvSpPr>
+          <p:nvPr>
+            <p:ph idx="1"/>
+          </p:nvPr>
+        </p:nvSpPr>
+        <p:spPr/>
+        <p:txBody>
+          <a:bodyPr numCol="2"/>
+          <a:lstStyle/>
+          <a:p>
+            <a:r>
+              <a:rPr lang="en-US" dirty="0"/>
+              <a:t>Mean Speed</a:t>
+            </a:r>
+          </a:p>
+          <a:p>
+            <a:r>
+              <a:rPr lang="en-US" dirty="0"/>
+              <a:t>Standard Deviation</a:t>
+            </a:r>
+          </a:p>
+          <a:p>
+            <a:r>
+              <a:rPr lang="en-US" dirty="0"/>
+              <a:t>% Coverage</a:t>
+            </a:r>
+          </a:p>
+          <a:p>
+            <a:r>
+              <a:rPr lang="en-US" dirty="0"/>
+              <a:t>85</a:t>
+            </a:r>
+            <a:r>
+              <a:rPr lang="en-US" baseline="30000" dirty="0"/>
+              <a:t>th</a:t>
+            </a:r>
+            <a:r>
+              <a:rPr lang="en-US" dirty="0"/>
+              <a:t> percentile speed</a:t>
+            </a:r>
+          </a:p>
+          <a:p>
+            <a:r>
+              <a:rPr lang="en-US" dirty="0"/>
+              <a:t>5</a:t>
+            </a:r>
+            <a:r>
+              <a:rPr lang="en-US" baseline="30000" dirty="0"/>
+              <a:t>th</a:t>
+            </a:r>
+            <a:r>
+              <a:rPr lang="en-US" dirty="0"/>
+              <a:t> percentile speed</a:t>
+            </a:r>
+          </a:p>
+          <a:p>
+            <a:r>
+              <a:rPr lang="en-US" dirty="0"/>
+              <a:t>60</a:t>
+            </a:r>
+            <a:r>
+              <a:rPr lang="en-US" baseline="30000" dirty="0"/>
+              <a:t>th</a:t>
+            </a:r>
+            <a:r>
+              <a:rPr lang="en-US" dirty="0"/>
+              <a:t> percentile speed</a:t>
+            </a:r>
+          </a:p>
+          <a:p>
             <a:endParaRPr lang="en-US" dirty="0"/>
           </a:p>
-        </p:txBody>
-      </p:sp>
-      <p:pic>
-        <p:nvPicPr>
-          <p:cNvPr id="5" name="Content Placeholder 4"/>
-          <p:cNvPicPr>
-            <a:picLocks noGrp="1" noChangeAspect="1"/>
-          </p:cNvPicPr>
-          <p:nvPr>
-            <p:ph idx="1"/>
-          </p:nvPr>
-        </p:nvPicPr>
-        <p:blipFill>
-          <a:blip r:embed="rId2">
-            <a:extLst>
-              <a:ext uri="{28A0092B-C50C-407E-A947-70E740481C1C}">
-                <a14:useLocalDpi xmlns:a14="http://schemas.microsoft.com/office/drawing/2010/main" val="0"/>
-              </a:ext>
-            </a:extLst>
-          </a:blip>
-          <a:stretch>
-            <a:fillRect/>
-          </a:stretch>
-        </p:blipFill>
-        <p:spPr>
-          <a:xfrm>
-            <a:off x="1143000" y="2468880"/>
-            <a:ext cx="4556886" cy="4038600"/>
-          </a:xfrm>
-        </p:spPr>
-      </p:pic>
-      <p:sp>
-        <p:nvSpPr>
-          <p:cNvPr id="6" name="TextBox 5"/>
-          <p:cNvSpPr txBox="1"/>
-          <p:nvPr/>
-        </p:nvSpPr>
-        <p:spPr>
-          <a:xfrm>
-            <a:off x="2187003" y="1965960"/>
-            <a:ext cx="2468880" cy="369332"/>
-          </a:xfrm>
-          <a:prstGeom prst="rect">
-            <a:avLst/>
-          </a:prstGeom>
-          <a:noFill/>
-        </p:spPr>
-        <p:txBody>
-          <a:bodyPr wrap="square" rtlCol="0">
-            <a:spAutoFit/>
-          </a:bodyPr>
-          <a:lstStyle/>
-          <a:p>
-            <a:pPr algn="ctr"/>
-            <a:r>
-              <a:rPr lang="en-US" dirty="0"/>
-              <a:t>HERE</a:t>
-            </a:r>
-          </a:p>
-        </p:txBody>
-      </p:sp>
-      <p:sp>
-        <p:nvSpPr>
-          <p:cNvPr id="7" name="TextBox 6"/>
-          <p:cNvSpPr txBox="1"/>
-          <p:nvPr/>
-        </p:nvSpPr>
-        <p:spPr>
-          <a:xfrm>
-            <a:off x="7482902" y="1965960"/>
-            <a:ext cx="2468880" cy="369332"/>
-          </a:xfrm>
-          <a:prstGeom prst="rect">
-            <a:avLst/>
-          </a:prstGeom>
-          <a:noFill/>
-        </p:spPr>
-        <p:txBody>
-          <a:bodyPr wrap="square" rtlCol="0">
-            <a:spAutoFit/>
-          </a:bodyPr>
-          <a:lstStyle/>
-          <a:p>
-            <a:pPr algn="ctr"/>
-            <a:r>
-              <a:rPr lang="en-US" dirty="0"/>
-              <a:t>Bluetooth</a:t>
-            </a:r>
-          </a:p>
-        </p:txBody>
-      </p:sp>
-      <p:pic>
-        <p:nvPicPr>
-          <p:cNvPr id="8" name="Picture 7"/>
-          <p:cNvPicPr>
-            <a:picLocks noChangeAspect="1"/>
-          </p:cNvPicPr>
-          <p:nvPr/>
-        </p:nvPicPr>
-        <p:blipFill>
-          <a:blip r:embed="rId3">
-            <a:extLst>
-              <a:ext uri="{28A0092B-C50C-407E-A947-70E740481C1C}">
-                <a14:useLocalDpi xmlns:a14="http://schemas.microsoft.com/office/drawing/2010/main" val="0"/>
-              </a:ext>
-            </a:extLst>
-          </a:blip>
-          <a:stretch>
-            <a:fillRect/>
-          </a:stretch>
-        </p:blipFill>
-        <p:spPr>
-          <a:xfrm>
-            <a:off x="6758316" y="2468880"/>
-            <a:ext cx="3918051" cy="3774784"/>
-          </a:xfrm>
-          <a:prstGeom prst="rect">
-            <a:avLst/>
-          </a:prstGeom>
-        </p:spPr>
-      </p:pic>
+          <a:p>
+            <a:pPr marL="45720" indent="0">
+              <a:buNone/>
+            </a:pPr>
+            <a:endParaRPr lang="en-US" dirty="0"/>
+          </a:p>
+          <a:p>
+            <a:r>
+              <a:rPr lang="en-US" dirty="0"/>
+              <a:t>Travel Time Index (TTI)</a:t>
+            </a:r>
+          </a:p>
+          <a:p>
+            <a:r>
+              <a:rPr lang="en-US" dirty="0"/>
+              <a:t>Planning Time Index (PTI)</a:t>
+            </a:r>
+          </a:p>
+          <a:p>
+            <a:r>
+              <a:rPr lang="en-US" dirty="0"/>
+              <a:t>Buffer Index (BTI)</a:t>
+            </a:r>
+          </a:p>
+          <a:p>
+            <a:r>
+              <a:rPr lang="en-US" dirty="0"/>
+              <a:t>Pair plots between Mean and Epoch (5-min intervals)</a:t>
+            </a:r>
+          </a:p>
+          <a:p>
+            <a:endParaRPr lang="en-US" dirty="0"/>
+          </a:p>
+          <a:p>
+            <a:pPr marL="45720" indent="0">
+              <a:buNone/>
+            </a:pPr>
+            <a:endParaRPr lang="en-US" dirty="0"/>
+          </a:p>
+        </p:txBody>
+      </p:sp>
     </p:spTree>
     <p:extLst>
       <p:ext uri="{BB962C8B-B14F-4D97-AF65-F5344CB8AC3E}">
-        <p14:creationId xmlns:p14="http://schemas.microsoft.com/office/powerpoint/2010/main" val="3650496424"/>
+        <p14:creationId xmlns:p14="http://schemas.microsoft.com/office/powerpoint/2010/main" val="186715008"/>
       </p:ext>
     </p:extLst>
   </p:cSld>
@@ -4826,27 +5067,22 @@
           <a:lstStyle/>
           <a:p>
             <a:r>
-              <a:rPr lang="en-US" dirty="0" err="1"/>
-              <a:t>Pairplots</a:t>
-            </a:r>
-            <a:r>
-              <a:rPr lang="en-US" dirty="0"/>
-              <a:t>: Richmond Road to Alumni</a:t>
-            </a:r>
-            <a:endParaRPr lang="en-US" dirty="0"/>
-          </a:p>
-        </p:txBody>
-      </p:sp>
-      <p:sp>
-        <p:nvSpPr>
-          <p:cNvPr id="6" name="TextBox 5"/>
+              <a:rPr lang="en-US" dirty="0"/>
+              <a:t>Richmond Road to Alumni</a:t>
+            </a:r>
+          </a:p>
+        </p:txBody>
+      </p:sp>
+      <p:sp>
+        <p:nvSpPr>
+          <p:cNvPr id="9" name="TextBox 8"/>
           <p:cNvSpPr txBox="1"/>
           <p:nvPr/>
         </p:nvSpPr>
         <p:spPr>
           <a:xfrm>
-            <a:off x="2187003" y="1965960"/>
-            <a:ext cx="2468880" cy="369332"/>
+            <a:off x="1143000" y="2286000"/>
+            <a:ext cx="2526030" cy="2862322"/>
           </a:xfrm>
           <a:prstGeom prst="rect">
             <a:avLst/>
@@ -4859,98 +5095,76 @@
           </a:bodyPr>
           <a:lstStyle/>
           <a:p>
-            <a:pPr algn="ctr"/>
-            <a:r>
-              <a:rPr lang="en-US" dirty="0"/>
-              <a:t>HERE</a:t>
-            </a:r>
-          </a:p>
-        </p:txBody>
-      </p:sp>
-      <p:sp>
-        <p:nvSpPr>
-          <p:cNvPr id="7" name="TextBox 6"/>
-          <p:cNvSpPr txBox="1"/>
-          <p:nvPr/>
-        </p:nvSpPr>
-        <p:spPr>
-          <a:xfrm>
-            <a:off x="7482902" y="1965960"/>
-            <a:ext cx="2468880" cy="369332"/>
-          </a:xfrm>
-          <a:prstGeom prst="rect">
-            <a:avLst/>
-          </a:prstGeom>
-          <a:noFill/>
-        </p:spPr>
-        <p:txBody>
-          <a:bodyPr wrap="square" rtlCol="0">
-            <a:spAutoFit/>
-          </a:bodyPr>
-          <a:lstStyle/>
-          <a:p>
-            <a:pPr algn="ctr"/>
-            <a:r>
-              <a:rPr lang="en-US" dirty="0"/>
-              <a:t>Bluetooth</a:t>
+            <a:r>
+              <a:rPr lang="en-US" dirty="0"/>
+              <a:t>Notes:</a:t>
+            </a:r>
+          </a:p>
+          <a:p>
+            <a:endParaRPr lang="en-US" dirty="0"/>
+          </a:p>
+          <a:p>
+            <a:pPr marL="285750" indent="-285750">
+              <a:buFont typeface="Arial" panose="020B0604020202020204" pitchFamily="34" charset="0"/>
+              <a:buChar char="•"/>
+            </a:pPr>
+            <a:r>
+              <a:rPr lang="en-US" dirty="0" err="1"/>
+              <a:t>Pct</a:t>
+            </a:r>
+            <a:r>
+              <a:rPr lang="en-US" dirty="0"/>
+              <a:t> Intervals for HERE is by link.  </a:t>
+            </a:r>
+            <a:r>
+              <a:rPr lang="en-US" dirty="0" err="1"/>
+              <a:t>Pct</a:t>
+            </a:r>
+            <a:r>
+              <a:rPr lang="en-US" dirty="0"/>
+              <a:t> Intervals for Bluetooth is by segment</a:t>
+            </a:r>
+          </a:p>
+          <a:p>
+            <a:pPr marL="285750" indent="-285750">
+              <a:buFont typeface="Arial" panose="020B0604020202020204" pitchFamily="34" charset="0"/>
+              <a:buChar char="•"/>
+            </a:pPr>
+            <a:r>
+              <a:rPr lang="en-US" dirty="0"/>
+              <a:t>HERE 60</a:t>
+            </a:r>
+            <a:r>
+              <a:rPr lang="en-US" baseline="30000" dirty="0"/>
+              <a:t>th</a:t>
+            </a:r>
+            <a:r>
+              <a:rPr lang="en-US" dirty="0"/>
+              <a:t> speed is calculated between 6AM and 8PM</a:t>
             </a:r>
           </a:p>
         </p:txBody>
       </p:sp>
       <p:pic>
         <p:nvPicPr>
-          <p:cNvPr id="4" name="Picture 3"/>
+          <p:cNvPr id="10" name="Content Placeholder 9"/>
           <p:cNvPicPr>
-            <a:picLocks noChangeAspect="1"/>
+            <a:picLocks noGrp="1" noChangeAspect="1"/>
           </p:cNvPicPr>
-          <p:nvPr/>
+          <p:nvPr>
+            <p:ph idx="1"/>
+          </p:nvPr>
         </p:nvPicPr>
         <p:blipFill>
-          <a:blip r:embed="rId2">
-            <a:extLst>
-              <a:ext uri="{28A0092B-C50C-407E-A947-70E740481C1C}">
-                <a14:useLocalDpi xmlns:a14="http://schemas.microsoft.com/office/drawing/2010/main" val="0"/>
-              </a:ext>
-            </a:extLst>
-          </a:blip>
+          <a:blip r:embed="rId2"/>
           <a:stretch>
             <a:fillRect/>
           </a:stretch>
         </p:blipFill>
         <p:spPr>
           <a:xfrm>
-            <a:off x="5943395" y="2335292"/>
-            <a:ext cx="5547894" cy="3353578"/>
-          </a:xfrm>
-          <a:prstGeom prst="rect">
-            <a:avLst/>
-          </a:prstGeom>
-        </p:spPr>
-      </p:pic>
-      <p:pic>
-        <p:nvPicPr>
-          <p:cNvPr id="9" name="Picture 8"/>
-          <p:cNvPicPr>
-            <a:picLocks noChangeAspect="1"/>
-          </p:cNvPicPr>
-          <p:nvPr/>
-        </p:nvPicPr>
-        <p:blipFill>
-          <a:blip r:embed="rId3">
-            <a:extLst>
-              <a:ext uri="{28A0092B-C50C-407E-A947-70E740481C1C}">
-                <a14:useLocalDpi xmlns:a14="http://schemas.microsoft.com/office/drawing/2010/main" val="0"/>
-              </a:ext>
-            </a:extLst>
-          </a:blip>
-          <a:stretch>
-            <a:fillRect/>
-          </a:stretch>
-        </p:blipFill>
-        <p:spPr>
-          <a:xfrm>
-            <a:off x="802754" y="2335292"/>
-            <a:ext cx="5237378" cy="3353578"/>
+            <a:off x="4678032" y="1965960"/>
+            <a:ext cx="7249093" cy="4038600"/>
           </a:xfrm>
           <a:prstGeom prst="rect">
             <a:avLst/>
@@ -4960,7 +5174,7 @@
     </p:spTree>
     <p:extLst>
       <p:ext uri="{BB962C8B-B14F-4D97-AF65-F5344CB8AC3E}">
-        <p14:creationId xmlns:p14="http://schemas.microsoft.com/office/powerpoint/2010/main" val="3297271625"/>
+        <p14:creationId xmlns:p14="http://schemas.microsoft.com/office/powerpoint/2010/main" val="2675078279"/>
       </p:ext>
     </p:extLst>
   </p:cSld>

</xml_diff>